<commit_message>
Migración Docente, estudiante y usuario
</commit_message>
<xml_diff>
--- a/02 Implementación de software/02.6 Manuales/Capacitación a Docentes.pptx
+++ b/02 Implementación de software/02.6 Manuales/Capacitación a Docentes.pptx
@@ -122,6 +122,11 @@
       </a:defRPr>
     </a:lvl9pPr>
   </p:defaultTextStyle>
+  <p:extLst>
+    <p:ext uri="{EFAFB233-063F-42B5-8137-9DF3F51BA10A}">
+      <p15:sldGuideLst xmlns:p15="http://schemas.microsoft.com/office/powerpoint/2012/main"/>
+    </p:ext>
+  </p:extLst>
 </p:presentation>
 </file>
 
@@ -294,7 +299,7 @@
           <a:p>
             <a:fld id="{CBD0B0C7-F34B-47CA-9D76-7E549CE45CD5}" type="datetimeFigureOut">
               <a:rPr lang="es-MX" smtClean="0"/>
-              <a:t>10/06/2018</a:t>
+              <a:t>11/06/2018</a:t>
             </a:fld>
             <a:endParaRPr lang="es-MX"/>
           </a:p>
@@ -507,13 +512,13 @@
   <p:clrMapOvr>
     <a:overrideClrMapping bg1="lt1" tx1="dk1" bg2="lt2" tx2="dk2" accent1="accent1" accent2="accent2" accent3="accent3" accent4="accent4" accent5="accent5" accent6="accent6" hlink="hlink" folHlink="folHlink"/>
   </p:clrMapOvr>
-  <mc:AlternateContent xmlns:mc="http://schemas.openxmlformats.org/markup-compatibility/2006">
-    <mc:Choice xmlns:p14="http://schemas.microsoft.com/office/powerpoint/2010/main" Requires="p14">
+  <mc:AlternateContent xmlns:mc="http://schemas.openxmlformats.org/markup-compatibility/2006" xmlns:p14="http://schemas.microsoft.com/office/powerpoint/2010/main">
+    <mc:Choice Requires="p14">
       <p:transition spd="med" p14:dur="700">
         <p:fade/>
       </p:transition>
     </mc:Choice>
-    <mc:Fallback>
+    <mc:Fallback xmlns="">
       <p:transition spd="med">
         <p:fade/>
       </p:transition>
@@ -636,7 +641,7 @@
           <a:p>
             <a:fld id="{CBD0B0C7-F34B-47CA-9D76-7E549CE45CD5}" type="datetimeFigureOut">
               <a:rPr lang="es-MX" smtClean="0"/>
-              <a:t>10/06/2018</a:t>
+              <a:t>11/06/2018</a:t>
             </a:fld>
             <a:endParaRPr lang="es-MX"/>
           </a:p>
@@ -694,13 +699,13 @@
   <p:clrMapOvr>
     <a:masterClrMapping/>
   </p:clrMapOvr>
-  <mc:AlternateContent xmlns:mc="http://schemas.openxmlformats.org/markup-compatibility/2006">
-    <mc:Choice xmlns:p14="http://schemas.microsoft.com/office/powerpoint/2010/main" Requires="p14">
+  <mc:AlternateContent xmlns:mc="http://schemas.openxmlformats.org/markup-compatibility/2006" xmlns:p14="http://schemas.microsoft.com/office/powerpoint/2010/main">
+    <mc:Choice Requires="p14">
       <p:transition spd="med" p14:dur="700">
         <p:fade/>
       </p:transition>
     </mc:Choice>
-    <mc:Fallback>
+    <mc:Fallback xmlns="">
       <p:transition spd="med">
         <p:fade/>
       </p:transition>
@@ -828,7 +833,7 @@
           <a:p>
             <a:fld id="{CBD0B0C7-F34B-47CA-9D76-7E549CE45CD5}" type="datetimeFigureOut">
               <a:rPr lang="es-MX" smtClean="0"/>
-              <a:t>10/06/2018</a:t>
+              <a:t>11/06/2018</a:t>
             </a:fld>
             <a:endParaRPr lang="es-MX"/>
           </a:p>
@@ -886,13 +891,13 @@
   <p:clrMapOvr>
     <a:masterClrMapping/>
   </p:clrMapOvr>
-  <mc:AlternateContent xmlns:mc="http://schemas.openxmlformats.org/markup-compatibility/2006">
-    <mc:Choice xmlns:p14="http://schemas.microsoft.com/office/powerpoint/2010/main" Requires="p14">
+  <mc:AlternateContent xmlns:mc="http://schemas.openxmlformats.org/markup-compatibility/2006" xmlns:p14="http://schemas.microsoft.com/office/powerpoint/2010/main">
+    <mc:Choice Requires="p14">
       <p:transition spd="med" p14:dur="700">
         <p:fade/>
       </p:transition>
     </mc:Choice>
-    <mc:Fallback>
+    <mc:Fallback xmlns="">
       <p:transition spd="med">
         <p:fade/>
       </p:transition>
@@ -1010,7 +1015,7 @@
           <a:p>
             <a:fld id="{CBD0B0C7-F34B-47CA-9D76-7E549CE45CD5}" type="datetimeFigureOut">
               <a:rPr lang="es-MX" smtClean="0"/>
-              <a:t>10/06/2018</a:t>
+              <a:t>11/06/2018</a:t>
             </a:fld>
             <a:endParaRPr lang="es-MX"/>
           </a:p>
@@ -1068,13 +1073,13 @@
   <p:clrMapOvr>
     <a:masterClrMapping/>
   </p:clrMapOvr>
-  <mc:AlternateContent xmlns:mc="http://schemas.openxmlformats.org/markup-compatibility/2006">
-    <mc:Choice xmlns:p14="http://schemas.microsoft.com/office/powerpoint/2010/main" Requires="p14">
+  <mc:AlternateContent xmlns:mc="http://schemas.openxmlformats.org/markup-compatibility/2006" xmlns:p14="http://schemas.microsoft.com/office/powerpoint/2010/main">
+    <mc:Choice Requires="p14">
       <p:transition spd="med" p14:dur="700">
         <p:fade/>
       </p:transition>
     </mc:Choice>
-    <mc:Fallback>
+    <mc:Fallback xmlns="">
       <p:transition spd="med">
         <p:fade/>
       </p:transition>
@@ -1299,7 +1304,7 @@
           <a:p>
             <a:fld id="{CBD0B0C7-F34B-47CA-9D76-7E549CE45CD5}" type="datetimeFigureOut">
               <a:rPr lang="es-MX" smtClean="0"/>
-              <a:t>10/06/2018</a:t>
+              <a:t>11/06/2018</a:t>
             </a:fld>
             <a:endParaRPr lang="es-MX"/>
           </a:p>
@@ -1439,13 +1444,13 @@
   <p:clrMapOvr>
     <a:overrideClrMapping bg1="dk1" tx1="lt1" bg2="dk2" tx2="lt2" accent1="accent1" accent2="accent2" accent3="accent3" accent4="accent4" accent5="accent5" accent6="accent6" hlink="hlink" folHlink="folHlink"/>
   </p:clrMapOvr>
-  <mc:AlternateContent xmlns:mc="http://schemas.openxmlformats.org/markup-compatibility/2006">
-    <mc:Choice xmlns:p14="http://schemas.microsoft.com/office/powerpoint/2010/main" Requires="p14">
+  <mc:AlternateContent xmlns:mc="http://schemas.openxmlformats.org/markup-compatibility/2006" xmlns:p14="http://schemas.microsoft.com/office/powerpoint/2010/main">
+    <mc:Choice Requires="p14">
       <p:transition spd="med" p14:dur="700">
         <p:fade/>
       </p:transition>
     </mc:Choice>
-    <mc:Fallback>
+    <mc:Fallback xmlns="">
       <p:transition spd="med">
         <p:fade/>
       </p:transition>
@@ -1705,7 +1710,7 @@
           <a:p>
             <a:fld id="{CBD0B0C7-F34B-47CA-9D76-7E549CE45CD5}" type="datetimeFigureOut">
               <a:rPr lang="es-MX" smtClean="0"/>
-              <a:t>10/06/2018</a:t>
+              <a:t>11/06/2018</a:t>
             </a:fld>
             <a:endParaRPr lang="es-MX"/>
           </a:p>
@@ -1763,13 +1768,13 @@
   <p:clrMapOvr>
     <a:masterClrMapping/>
   </p:clrMapOvr>
-  <mc:AlternateContent xmlns:mc="http://schemas.openxmlformats.org/markup-compatibility/2006">
-    <mc:Choice xmlns:p14="http://schemas.microsoft.com/office/powerpoint/2010/main" Requires="p14">
+  <mc:AlternateContent xmlns:mc="http://schemas.openxmlformats.org/markup-compatibility/2006" xmlns:p14="http://schemas.microsoft.com/office/powerpoint/2010/main">
+    <mc:Choice Requires="p14">
       <p:transition spd="med" p14:dur="700">
         <p:fade/>
       </p:transition>
     </mc:Choice>
-    <mc:Fallback>
+    <mc:Fallback xmlns="">
       <p:transition spd="med">
         <p:fade/>
       </p:transition>
@@ -2194,7 +2199,7 @@
           <a:p>
             <a:fld id="{CBD0B0C7-F34B-47CA-9D76-7E549CE45CD5}" type="datetimeFigureOut">
               <a:rPr lang="es-MX" smtClean="0"/>
-              <a:t>10/06/2018</a:t>
+              <a:t>11/06/2018</a:t>
             </a:fld>
             <a:endParaRPr lang="es-MX"/>
           </a:p>
@@ -2252,13 +2257,13 @@
   <p:clrMapOvr>
     <a:masterClrMapping/>
   </p:clrMapOvr>
-  <mc:AlternateContent xmlns:mc="http://schemas.openxmlformats.org/markup-compatibility/2006">
-    <mc:Choice xmlns:p14="http://schemas.microsoft.com/office/powerpoint/2010/main" Requires="p14">
+  <mc:AlternateContent xmlns:mc="http://schemas.openxmlformats.org/markup-compatibility/2006" xmlns:p14="http://schemas.microsoft.com/office/powerpoint/2010/main">
+    <mc:Choice Requires="p14">
       <p:transition spd="med" p14:dur="700">
         <p:fade/>
       </p:transition>
     </mc:Choice>
-    <mc:Fallback>
+    <mc:Fallback xmlns="">
       <p:transition spd="med">
         <p:fade/>
       </p:transition>
@@ -2324,7 +2329,7 @@
           <a:p>
             <a:fld id="{CBD0B0C7-F34B-47CA-9D76-7E549CE45CD5}" type="datetimeFigureOut">
               <a:rPr lang="es-MX" smtClean="0"/>
-              <a:t>10/06/2018</a:t>
+              <a:t>11/06/2018</a:t>
             </a:fld>
             <a:endParaRPr lang="es-MX"/>
           </a:p>
@@ -2382,13 +2387,13 @@
   <p:clrMapOvr>
     <a:masterClrMapping/>
   </p:clrMapOvr>
-  <mc:AlternateContent xmlns:mc="http://schemas.openxmlformats.org/markup-compatibility/2006">
-    <mc:Choice xmlns:p14="http://schemas.microsoft.com/office/powerpoint/2010/main" Requires="p14">
+  <mc:AlternateContent xmlns:mc="http://schemas.openxmlformats.org/markup-compatibility/2006" xmlns:p14="http://schemas.microsoft.com/office/powerpoint/2010/main">
+    <mc:Choice Requires="p14">
       <p:transition spd="med" p14:dur="700">
         <p:fade/>
       </p:transition>
     </mc:Choice>
-    <mc:Fallback>
+    <mc:Fallback xmlns="">
       <p:transition spd="med">
         <p:fade/>
       </p:transition>
@@ -2431,7 +2436,7 @@
           <a:p>
             <a:fld id="{CBD0B0C7-F34B-47CA-9D76-7E549CE45CD5}" type="datetimeFigureOut">
               <a:rPr lang="es-MX" smtClean="0"/>
-              <a:t>10/06/2018</a:t>
+              <a:t>11/06/2018</a:t>
             </a:fld>
             <a:endParaRPr lang="es-MX"/>
           </a:p>
@@ -2489,13 +2494,13 @@
   <p:clrMapOvr>
     <a:masterClrMapping/>
   </p:clrMapOvr>
-  <mc:AlternateContent xmlns:mc="http://schemas.openxmlformats.org/markup-compatibility/2006">
-    <mc:Choice xmlns:p14="http://schemas.microsoft.com/office/powerpoint/2010/main" Requires="p14">
+  <mc:AlternateContent xmlns:mc="http://schemas.openxmlformats.org/markup-compatibility/2006" xmlns:p14="http://schemas.microsoft.com/office/powerpoint/2010/main">
+    <mc:Choice Requires="p14">
       <p:transition spd="med" p14:dur="700">
         <p:fade/>
       </p:transition>
     </mc:Choice>
-    <mc:Fallback>
+    <mc:Fallback xmlns="">
       <p:transition spd="med">
         <p:fade/>
       </p:transition>
@@ -2789,7 +2794,7 @@
           <a:p>
             <a:fld id="{CBD0B0C7-F34B-47CA-9D76-7E549CE45CD5}" type="datetimeFigureOut">
               <a:rPr lang="es-MX" smtClean="0"/>
-              <a:t>10/06/2018</a:t>
+              <a:t>11/06/2018</a:t>
             </a:fld>
             <a:endParaRPr lang="es-MX"/>
           </a:p>
@@ -2911,13 +2916,13 @@
   <p:clrMapOvr>
     <a:masterClrMapping/>
   </p:clrMapOvr>
-  <mc:AlternateContent xmlns:mc="http://schemas.openxmlformats.org/markup-compatibility/2006">
-    <mc:Choice xmlns:p14="http://schemas.microsoft.com/office/powerpoint/2010/main" Requires="p14">
+  <mc:AlternateContent xmlns:mc="http://schemas.openxmlformats.org/markup-compatibility/2006" xmlns:p14="http://schemas.microsoft.com/office/powerpoint/2010/main">
+    <mc:Choice Requires="p14">
       <p:transition spd="med" p14:dur="700">
         <p:fade/>
       </p:transition>
     </mc:Choice>
-    <mc:Fallback>
+    <mc:Fallback xmlns="">
       <p:transition spd="med">
         <p:fade/>
       </p:transition>
@@ -3189,7 +3194,7 @@
           <a:p>
             <a:fld id="{CBD0B0C7-F34B-47CA-9D76-7E549CE45CD5}" type="datetimeFigureOut">
               <a:rPr lang="es-MX" smtClean="0"/>
-              <a:t>10/06/2018</a:t>
+              <a:t>11/06/2018</a:t>
             </a:fld>
             <a:endParaRPr lang="es-MX"/>
           </a:p>
@@ -3311,13 +3316,13 @@
   <p:clrMapOvr>
     <a:masterClrMapping/>
   </p:clrMapOvr>
-  <mc:AlternateContent xmlns:mc="http://schemas.openxmlformats.org/markup-compatibility/2006">
-    <mc:Choice xmlns:p14="http://schemas.microsoft.com/office/powerpoint/2010/main" Requires="p14">
+  <mc:AlternateContent xmlns:mc="http://schemas.openxmlformats.org/markup-compatibility/2006" xmlns:p14="http://schemas.microsoft.com/office/powerpoint/2010/main">
+    <mc:Choice Requires="p14">
       <p:transition spd="med" p14:dur="700">
         <p:fade/>
       </p:transition>
     </mc:Choice>
-    <mc:Fallback>
+    <mc:Fallback xmlns="">
       <p:transition spd="med">
         <p:fade/>
       </p:transition>
@@ -3479,7 +3484,7 @@
           <a:p>
             <a:fld id="{CBD0B0C7-F34B-47CA-9D76-7E549CE45CD5}" type="datetimeFigureOut">
               <a:rPr lang="es-MX" smtClean="0"/>
-              <a:t>10/06/2018</a:t>
+              <a:t>11/06/2018</a:t>
             </a:fld>
             <a:endParaRPr lang="es-MX"/>
           </a:p>
@@ -3618,13 +3623,13 @@
     <p:sldLayoutId id="2147483688" r:id="rId10"/>
     <p:sldLayoutId id="2147483689" r:id="rId11"/>
   </p:sldLayoutIdLst>
-  <mc:AlternateContent xmlns:mc="http://schemas.openxmlformats.org/markup-compatibility/2006">
-    <mc:Choice xmlns:p14="http://schemas.microsoft.com/office/powerpoint/2010/main" Requires="p14">
+  <mc:AlternateContent xmlns:mc="http://schemas.openxmlformats.org/markup-compatibility/2006" xmlns:p14="http://schemas.microsoft.com/office/powerpoint/2010/main">
+    <mc:Choice Requires="p14">
       <p:transition spd="med" p14:dur="700">
         <p:fade/>
       </p:transition>
     </mc:Choice>
-    <mc:Fallback>
+    <mc:Fallback xmlns="">
       <p:transition spd="med">
         <p:fade/>
       </p:transition>
@@ -4061,13 +4066,13 @@
   <p:clrMapOvr>
     <a:masterClrMapping/>
   </p:clrMapOvr>
-  <mc:AlternateContent xmlns:mc="http://schemas.openxmlformats.org/markup-compatibility/2006">
-    <mc:Choice xmlns:p14="http://schemas.microsoft.com/office/powerpoint/2010/main" Requires="p14">
+  <mc:AlternateContent xmlns:mc="http://schemas.openxmlformats.org/markup-compatibility/2006" xmlns:p14="http://schemas.microsoft.com/office/powerpoint/2010/main">
+    <mc:Choice Requires="p14">
       <p:transition spd="med" p14:dur="700">
         <p:fade/>
       </p:transition>
     </mc:Choice>
-    <mc:Fallback>
+    <mc:Fallback xmlns="">
       <p:transition spd="med">
         <p:fade/>
       </p:transition>
@@ -4166,7 +4171,7 @@
           <a:p>
             <a:r>
               <a:rPr lang="es-MX" sz="3600" dirty="0" smtClean="0"/>
-              <a:t>192.168.123.15/idiomas</a:t>
+              <a:t>192.168.123.11/idiomas</a:t>
             </a:r>
             <a:endParaRPr lang="es-MX" sz="3600" dirty="0"/>
           </a:p>
@@ -4182,13 +4187,13 @@
   <p:clrMapOvr>
     <a:masterClrMapping/>
   </p:clrMapOvr>
-  <mc:AlternateContent xmlns:mc="http://schemas.openxmlformats.org/markup-compatibility/2006">
-    <mc:Choice xmlns:p14="http://schemas.microsoft.com/office/powerpoint/2010/main" Requires="p14">
+  <mc:AlternateContent xmlns:mc="http://schemas.openxmlformats.org/markup-compatibility/2006" xmlns:p14="http://schemas.microsoft.com/office/powerpoint/2010/main">
+    <mc:Choice Requires="p14">
       <p:transition spd="med" p14:dur="700">
         <p:fade/>
       </p:transition>
     </mc:Choice>
-    <mc:Fallback>
+    <mc:Fallback xmlns="">
       <p:transition spd="med">
         <p:fade/>
       </p:transition>
@@ -4368,13 +4373,13 @@
   <p:clrMapOvr>
     <a:masterClrMapping/>
   </p:clrMapOvr>
-  <mc:AlternateContent xmlns:mc="http://schemas.openxmlformats.org/markup-compatibility/2006">
-    <mc:Choice xmlns:p14="http://schemas.microsoft.com/office/powerpoint/2010/main" Requires="p14">
+  <mc:AlternateContent xmlns:mc="http://schemas.openxmlformats.org/markup-compatibility/2006" xmlns:p14="http://schemas.microsoft.com/office/powerpoint/2010/main">
+    <mc:Choice Requires="p14">
       <p:transition spd="med" p14:dur="700">
         <p:fade/>
       </p:transition>
     </mc:Choice>
-    <mc:Fallback>
+    <mc:Fallback xmlns="">
       <p:transition spd="med">
         <p:fade/>
       </p:transition>
@@ -4599,13 +4604,13 @@
   <p:clrMapOvr>
     <a:masterClrMapping/>
   </p:clrMapOvr>
-  <mc:AlternateContent xmlns:mc="http://schemas.openxmlformats.org/markup-compatibility/2006">
-    <mc:Choice xmlns:p14="http://schemas.microsoft.com/office/powerpoint/2010/main" Requires="p14">
+  <mc:AlternateContent xmlns:mc="http://schemas.openxmlformats.org/markup-compatibility/2006" xmlns:p14="http://schemas.microsoft.com/office/powerpoint/2010/main">
+    <mc:Choice Requires="p14">
       <p:transition spd="med" p14:dur="700">
         <p:fade/>
       </p:transition>
     </mc:Choice>
-    <mc:Fallback>
+    <mc:Fallback xmlns="">
       <p:transition spd="med">
         <p:fade/>
       </p:transition>
@@ -5017,13 +5022,13 @@
   <p:clrMapOvr>
     <a:masterClrMapping/>
   </p:clrMapOvr>
-  <mc:AlternateContent xmlns:mc="http://schemas.openxmlformats.org/markup-compatibility/2006">
-    <mc:Choice xmlns:p14="http://schemas.microsoft.com/office/powerpoint/2010/main" Requires="p14">
+  <mc:AlternateContent xmlns:mc="http://schemas.openxmlformats.org/markup-compatibility/2006" xmlns:p14="http://schemas.microsoft.com/office/powerpoint/2010/main">
+    <mc:Choice Requires="p14">
       <p:transition spd="med" p14:dur="700">
         <p:fade/>
       </p:transition>
     </mc:Choice>
-    <mc:Fallback>
+    <mc:Fallback xmlns="">
       <p:transition spd="med">
         <p:fade/>
       </p:transition>
@@ -5203,13 +5208,13 @@
   <p:clrMapOvr>
     <a:masterClrMapping/>
   </p:clrMapOvr>
-  <mc:AlternateContent xmlns:mc="http://schemas.openxmlformats.org/markup-compatibility/2006">
-    <mc:Choice xmlns:p14="http://schemas.microsoft.com/office/powerpoint/2010/main" Requires="p14">
+  <mc:AlternateContent xmlns:mc="http://schemas.openxmlformats.org/markup-compatibility/2006" xmlns:p14="http://schemas.microsoft.com/office/powerpoint/2010/main">
+    <mc:Choice Requires="p14">
       <p:transition spd="med" p14:dur="700">
         <p:fade/>
       </p:transition>
     </mc:Choice>
-    <mc:Fallback>
+    <mc:Fallback xmlns="">
       <p:transition spd="med">
         <p:fade/>
       </p:transition>
@@ -5521,13 +5526,13 @@
   <p:clrMapOvr>
     <a:masterClrMapping/>
   </p:clrMapOvr>
-  <mc:AlternateContent xmlns:mc="http://schemas.openxmlformats.org/markup-compatibility/2006">
-    <mc:Choice xmlns:p14="http://schemas.microsoft.com/office/powerpoint/2010/main" Requires="p14">
+  <mc:AlternateContent xmlns:mc="http://schemas.openxmlformats.org/markup-compatibility/2006" xmlns:p14="http://schemas.microsoft.com/office/powerpoint/2010/main">
+    <mc:Choice Requires="p14">
       <p:transition spd="med" p14:dur="700">
         <p:fade/>
       </p:transition>
     </mc:Choice>
-    <mc:Fallback>
+    <mc:Fallback xmlns="">
       <p:transition spd="med">
         <p:fade/>
       </p:transition>
@@ -5946,13 +5951,13 @@
   <p:clrMapOvr>
     <a:masterClrMapping/>
   </p:clrMapOvr>
-  <mc:AlternateContent xmlns:mc="http://schemas.openxmlformats.org/markup-compatibility/2006">
-    <mc:Choice xmlns:p14="http://schemas.microsoft.com/office/powerpoint/2010/main" Requires="p14">
+  <mc:AlternateContent xmlns:mc="http://schemas.openxmlformats.org/markup-compatibility/2006" xmlns:p14="http://schemas.microsoft.com/office/powerpoint/2010/main">
+    <mc:Choice Requires="p14">
       <p:transition spd="med" p14:dur="700">
         <p:fade/>
       </p:transition>
     </mc:Choice>
-    <mc:Fallback>
+    <mc:Fallback xmlns="">
       <p:transition spd="med">
         <p:fade/>
       </p:transition>
@@ -6290,13 +6295,13 @@
   <p:clrMapOvr>
     <a:masterClrMapping/>
   </p:clrMapOvr>
-  <mc:AlternateContent xmlns:mc="http://schemas.openxmlformats.org/markup-compatibility/2006">
-    <mc:Choice xmlns:p14="http://schemas.microsoft.com/office/powerpoint/2010/main" Requires="p14">
+  <mc:AlternateContent xmlns:mc="http://schemas.openxmlformats.org/markup-compatibility/2006" xmlns:p14="http://schemas.microsoft.com/office/powerpoint/2010/main">
+    <mc:Choice Requires="p14">
       <p:transition spd="med" p14:dur="700">
         <p:fade/>
       </p:transition>
     </mc:Choice>
-    <mc:Fallback>
+    <mc:Fallback xmlns="">
       <p:transition spd="med">
         <p:fade/>
       </p:transition>
@@ -6387,13 +6392,13 @@
   <p:clrMapOvr>
     <a:masterClrMapping/>
   </p:clrMapOvr>
-  <mc:AlternateContent xmlns:mc="http://schemas.openxmlformats.org/markup-compatibility/2006">
-    <mc:Choice xmlns:p14="http://schemas.microsoft.com/office/powerpoint/2010/main" Requires="p14">
+  <mc:AlternateContent xmlns:mc="http://schemas.openxmlformats.org/markup-compatibility/2006" xmlns:p14="http://schemas.microsoft.com/office/powerpoint/2010/main">
+    <mc:Choice Requires="p14">
       <p:transition spd="med" p14:dur="700">
         <p:fade/>
       </p:transition>
     </mc:Choice>
-    <mc:Fallback>
+    <mc:Fallback xmlns="">
       <p:transition spd="med">
         <p:fade/>
       </p:transition>
@@ -6484,13 +6489,13 @@
   <p:clrMapOvr>
     <a:masterClrMapping/>
   </p:clrMapOvr>
-  <mc:AlternateContent xmlns:mc="http://schemas.openxmlformats.org/markup-compatibility/2006">
-    <mc:Choice xmlns:p14="http://schemas.microsoft.com/office/powerpoint/2010/main" Requires="p14">
+  <mc:AlternateContent xmlns:mc="http://schemas.openxmlformats.org/markup-compatibility/2006" xmlns:p14="http://schemas.microsoft.com/office/powerpoint/2010/main">
+    <mc:Choice Requires="p14">
       <p:transition spd="med" p14:dur="700">
         <p:fade/>
       </p:transition>
     </mc:Choice>
-    <mc:Fallback>
+    <mc:Fallback xmlns="">
       <p:transition spd="med">
         <p:fade/>
       </p:transition>
@@ -6612,13 +6617,13 @@
   <p:clrMapOvr>
     <a:masterClrMapping/>
   </p:clrMapOvr>
-  <mc:AlternateContent xmlns:mc="http://schemas.openxmlformats.org/markup-compatibility/2006">
-    <mc:Choice xmlns:p14="http://schemas.microsoft.com/office/powerpoint/2010/main" Requires="p14">
+  <mc:AlternateContent xmlns:mc="http://schemas.openxmlformats.org/markup-compatibility/2006" xmlns:p14="http://schemas.microsoft.com/office/powerpoint/2010/main">
+    <mc:Choice Requires="p14">
       <p:transition spd="med" p14:dur="700">
         <p:fade/>
       </p:transition>
     </mc:Choice>
-    <mc:Fallback>
+    <mc:Fallback xmlns="">
       <p:transition spd="med">
         <p:fade/>
       </p:transition>
@@ -6723,13 +6728,13 @@
   <p:clrMapOvr>
     <a:masterClrMapping/>
   </p:clrMapOvr>
-  <mc:AlternateContent xmlns:mc="http://schemas.openxmlformats.org/markup-compatibility/2006">
-    <mc:Choice xmlns:p14="http://schemas.microsoft.com/office/powerpoint/2010/main" Requires="p14">
+  <mc:AlternateContent xmlns:mc="http://schemas.openxmlformats.org/markup-compatibility/2006" xmlns:p14="http://schemas.microsoft.com/office/powerpoint/2010/main">
+    <mc:Choice Requires="p14">
       <p:transition spd="med" p14:dur="700">
         <p:fade/>
       </p:transition>
     </mc:Choice>
-    <mc:Fallback>
+    <mc:Fallback xmlns="">
       <p:transition spd="med">
         <p:fade/>
       </p:transition>
@@ -6891,13 +6896,13 @@
   <p:clrMapOvr>
     <a:masterClrMapping/>
   </p:clrMapOvr>
-  <mc:AlternateContent xmlns:mc="http://schemas.openxmlformats.org/markup-compatibility/2006">
-    <mc:Choice xmlns:p14="http://schemas.microsoft.com/office/powerpoint/2010/main" Requires="p14">
+  <mc:AlternateContent xmlns:mc="http://schemas.openxmlformats.org/markup-compatibility/2006" xmlns:p14="http://schemas.microsoft.com/office/powerpoint/2010/main">
+    <mc:Choice Requires="p14">
       <p:transition spd="med" p14:dur="700">
         <p:fade/>
       </p:transition>
     </mc:Choice>
-    <mc:Fallback>
+    <mc:Fallback xmlns="">
       <p:transition spd="med">
         <p:fade/>
       </p:transition>
@@ -7002,13 +7007,13 @@
   <p:clrMapOvr>
     <a:masterClrMapping/>
   </p:clrMapOvr>
-  <mc:AlternateContent xmlns:mc="http://schemas.openxmlformats.org/markup-compatibility/2006">
-    <mc:Choice xmlns:p14="http://schemas.microsoft.com/office/powerpoint/2010/main" Requires="p14">
+  <mc:AlternateContent xmlns:mc="http://schemas.openxmlformats.org/markup-compatibility/2006" xmlns:p14="http://schemas.microsoft.com/office/powerpoint/2010/main">
+    <mc:Choice Requires="p14">
       <p:transition spd="med" p14:dur="700">
         <p:fade/>
       </p:transition>
     </mc:Choice>
-    <mc:Fallback>
+    <mc:Fallback xmlns="">
       <p:transition spd="med">
         <p:fade/>
       </p:transition>
@@ -7111,13 +7116,13 @@
   <p:clrMapOvr>
     <a:masterClrMapping/>
   </p:clrMapOvr>
-  <mc:AlternateContent xmlns:mc="http://schemas.openxmlformats.org/markup-compatibility/2006">
-    <mc:Choice xmlns:p14="http://schemas.microsoft.com/office/powerpoint/2010/main" Requires="p14">
+  <mc:AlternateContent xmlns:mc="http://schemas.openxmlformats.org/markup-compatibility/2006" xmlns:p14="http://schemas.microsoft.com/office/powerpoint/2010/main">
+    <mc:Choice Requires="p14">
       <p:transition spd="med" p14:dur="700">
         <p:fade/>
       </p:transition>
     </mc:Choice>
-    <mc:Fallback>
+    <mc:Fallback xmlns="">
       <p:transition spd="med">
         <p:fade/>
       </p:transition>
@@ -7315,13 +7320,13 @@
   <p:clrMapOvr>
     <a:masterClrMapping/>
   </p:clrMapOvr>
-  <mc:AlternateContent xmlns:mc="http://schemas.openxmlformats.org/markup-compatibility/2006">
-    <mc:Choice xmlns:p14="http://schemas.microsoft.com/office/powerpoint/2010/main" Requires="p14">
+  <mc:AlternateContent xmlns:mc="http://schemas.openxmlformats.org/markup-compatibility/2006" xmlns:p14="http://schemas.microsoft.com/office/powerpoint/2010/main">
+    <mc:Choice Requires="p14">
       <p:transition spd="med" p14:dur="700">
         <p:fade/>
       </p:transition>
     </mc:Choice>
-    <mc:Fallback>
+    <mc:Fallback xmlns="">
       <p:transition spd="med">
         <p:fade/>
       </p:transition>
@@ -7413,13 +7418,13 @@
   <p:clrMapOvr>
     <a:masterClrMapping/>
   </p:clrMapOvr>
-  <mc:AlternateContent xmlns:mc="http://schemas.openxmlformats.org/markup-compatibility/2006">
-    <mc:Choice xmlns:p14="http://schemas.microsoft.com/office/powerpoint/2010/main" Requires="p14">
+  <mc:AlternateContent xmlns:mc="http://schemas.openxmlformats.org/markup-compatibility/2006" xmlns:p14="http://schemas.microsoft.com/office/powerpoint/2010/main">
+    <mc:Choice Requires="p14">
       <p:transition spd="med" p14:dur="700">
         <p:fade/>
       </p:transition>
     </mc:Choice>
-    <mc:Fallback>
+    <mc:Fallback xmlns="">
       <p:transition spd="med">
         <p:fade/>
       </p:transition>
@@ -7504,13 +7509,13 @@
   <p:clrMapOvr>
     <a:masterClrMapping/>
   </p:clrMapOvr>
-  <mc:AlternateContent xmlns:mc="http://schemas.openxmlformats.org/markup-compatibility/2006">
-    <mc:Choice xmlns:p14="http://schemas.microsoft.com/office/powerpoint/2010/main" Requires="p14">
+  <mc:AlternateContent xmlns:mc="http://schemas.openxmlformats.org/markup-compatibility/2006" xmlns:p14="http://schemas.microsoft.com/office/powerpoint/2010/main">
+    <mc:Choice Requires="p14">
       <p:transition spd="med" p14:dur="700">
         <p:fade/>
       </p:transition>
     </mc:Choice>
-    <mc:Fallback>
+    <mc:Fallback xmlns="">
       <p:transition spd="med">
         <p:fade/>
       </p:transition>

</xml_diff>